<commit_message>
Continue to work on slides and snippets.  Add production mode snippet.
</commit_message>
<xml_diff>
--- a/docs/OfflineDebugging/A Dinosaur and a Python 02.pptx
+++ b/docs/OfflineDebugging/A Dinosaur and a Python 02.pptx
@@ -226,7 +226,7 @@
           <a:p>
             <a:fld id="{34DABC08-5500-4080-81A3-D11EBECCC5B6}" type="datetimeFigureOut">
               <a:rPr lang="en-US" smtClean="0"/>
-              <a:t>2021-01-19</a:t>
+              <a:t>2021-01-20</a:t>
             </a:fld>
             <a:endParaRPr lang="en-US"/>
           </a:p>
@@ -4566,8 +4566,64 @@
                 <a:ea typeface="+mn-ea"/>
                 <a:cs typeface="+mn-cs"/>
               </a:rPr>
-              <a:t>If you have an adequate method of tracing the flow and data of a program, reading a trace log might be easier and faster</a:t>
-            </a:r>
+              <a:t>Need an adequate method </a:t>
+            </a:r>
+            <a:r>
+              <a:rPr lang="en-US" dirty="0" smtClean="0"/>
+              <a:t>of watching what a program does/did</a:t>
+            </a:r>
+            <a:endParaRPr lang="en-US" sz="3200" kern="1200" dirty="0" smtClean="0">
+              <a:solidFill>
+                <a:schemeClr val="tx1"/>
+              </a:solidFill>
+              <a:effectLst/>
+              <a:latin typeface="+mn-lt"/>
+              <a:ea typeface="+mn-ea"/>
+              <a:cs typeface="+mn-cs"/>
+            </a:endParaRPr>
+          </a:p>
+          <a:p>
+            <a:pPr lvl="1"/>
+            <a:r>
+              <a:rPr lang="en-US" sz="2800" kern="1200" dirty="0" smtClean="0">
+                <a:solidFill>
+                  <a:schemeClr val="tx1"/>
+                </a:solidFill>
+                <a:effectLst/>
+                <a:latin typeface="+mn-lt"/>
+                <a:ea typeface="+mn-ea"/>
+                <a:cs typeface="+mn-cs"/>
+              </a:rPr>
+              <a:t>tracing the code flow and </a:t>
+            </a:r>
+          </a:p>
+          <a:p>
+            <a:pPr lvl="1"/>
+            <a:r>
+              <a:rPr lang="en-US" dirty="0" smtClean="0"/>
+              <a:t>tracing the </a:t>
+            </a:r>
+            <a:r>
+              <a:rPr lang="en-US" sz="2800" kern="1200" dirty="0" smtClean="0">
+                <a:solidFill>
+                  <a:schemeClr val="tx1"/>
+                </a:solidFill>
+                <a:effectLst/>
+                <a:latin typeface="+mn-lt"/>
+                <a:ea typeface="+mn-ea"/>
+                <a:cs typeface="+mn-cs"/>
+              </a:rPr>
+              <a:t>data progress</a:t>
+            </a:r>
+            <a:endParaRPr lang="en-US" sz="2400" kern="1200" dirty="0" smtClean="0">
+              <a:solidFill>
+                <a:schemeClr val="tx1"/>
+              </a:solidFill>
+              <a:effectLst/>
+              <a:latin typeface="+mn-lt"/>
+              <a:ea typeface="+mn-ea"/>
+              <a:cs typeface="+mn-cs"/>
+            </a:endParaRPr>
           </a:p>
           <a:p>
             <a:pPr lvl="0"/>
@@ -4625,7 +4681,7 @@
           <a:lstStyle/>
           <a:p>
             <a:r>
-              <a:rPr lang="en-US" smtClean="0"/>
+              <a:rPr lang="en-US" dirty="0" smtClean="0"/>
               <a:t>RBL - Boston Python</a:t>
             </a:r>
             <a:endParaRPr lang="en-US" dirty="0"/>
@@ -4773,13 +4829,8 @@
           <a:p>
             <a:r>
               <a:rPr lang="en-US" dirty="0" smtClean="0"/>
-              <a:t>Like print() on </a:t>
-            </a:r>
-            <a:r>
-              <a:rPr lang="en-US" dirty="0" smtClean="0"/>
-              <a:t>steroids</a:t>
-            </a:r>
-            <a:endParaRPr lang="en-US" dirty="0" smtClean="0"/>
+              <a:t>Like print() on steroids</a:t>
+            </a:r>
           </a:p>
           <a:p>
             <a:r>
@@ -4906,11 +4957,7 @@
           <a:p>
             <a:r>
               <a:rPr lang="en-US" dirty="0" smtClean="0"/>
-              <a:t>Ned is </a:t>
-            </a:r>
-            <a:r>
-              <a:rPr lang="en-US" dirty="0" smtClean="0"/>
-              <a:t>Holding His Nose</a:t>
+              <a:t>Ned is Holding His Nose</a:t>
             </a:r>
             <a:endParaRPr lang="en-US" dirty="0"/>
           </a:p>
@@ -5074,29 +5121,8 @@
                 <a:ea typeface="+mn-ea"/>
                 <a:cs typeface="+mn-cs"/>
               </a:rPr>
-              <a:t>First crude Python </a:t>
-            </a:r>
-            <a:r>
-              <a:rPr lang="en-US" sz="3200" kern="1200" dirty="0" smtClean="0">
-                <a:solidFill>
-                  <a:schemeClr val="tx1"/>
-                </a:solidFill>
-                <a:effectLst/>
-                <a:latin typeface="+mn-lt"/>
-                <a:ea typeface="+mn-ea"/>
-                <a:cs typeface="+mn-cs"/>
-              </a:rPr>
-              <a:t>version</a:t>
-            </a:r>
-            <a:endParaRPr lang="en-US" sz="3200" kern="1200" dirty="0" smtClean="0">
-              <a:solidFill>
-                <a:schemeClr val="tx1"/>
-              </a:solidFill>
-              <a:effectLst/>
-              <a:latin typeface="+mn-lt"/>
-              <a:ea typeface="+mn-ea"/>
-              <a:cs typeface="+mn-cs"/>
-            </a:endParaRPr>
+              <a:t>First crude Python version</a:t>
+            </a:r>
           </a:p>
           <a:p>
             <a:pPr lvl="1"/>
@@ -5562,7 +5588,7 @@
                 <a:ea typeface="+mn-ea"/>
                 <a:cs typeface="+mn-cs"/>
               </a:rPr>
-              <a:t>This trace facility written in PDP-11 assembler, C, C++, VB, Perl, Java, and finally Python.</a:t>
+              <a:t>This trace facility written in PDP-11 assembler, C, C++, VB, Perl, Java, and finally Python</a:t>
             </a:r>
           </a:p>
           <a:p>
@@ -5601,7 +5627,7 @@
                 <a:ea typeface="+mn-ea"/>
                 <a:cs typeface="+mn-cs"/>
               </a:rPr>
-              <a:t>a ten-process </a:t>
+              <a:t>a dozen-process </a:t>
             </a:r>
             <a:r>
               <a:rPr lang="en-US" sz="2800" kern="1200" dirty="0" err="1" smtClean="0">
@@ -5625,7 +5651,7 @@
                 <a:ea typeface="+mn-ea"/>
                 <a:cs typeface="+mn-cs"/>
               </a:rPr>
-              <a:t> system.  </a:t>
+              <a:t> system</a:t>
             </a:r>
           </a:p>
           <a:p>
@@ -5800,7 +5826,6 @@
               <a:rPr lang="en-US" dirty="0" smtClean="0"/>
               <a:t>Source location</a:t>
             </a:r>
-            <a:endParaRPr lang="en-US" dirty="0" smtClean="0"/>
           </a:p>
           <a:p>
             <a:r>
@@ -5821,6 +5846,12 @@
           <a:p>
             <a:r>
               <a:rPr lang="en-US" baseline="0" dirty="0" smtClean="0"/>
+              <a:t>Consistent format</a:t>
+            </a:r>
+          </a:p>
+          <a:p>
+            <a:r>
+              <a:rPr lang="en-US" baseline="0" dirty="0" smtClean="0"/>
               <a:t>File or </a:t>
             </a:r>
             <a:r>
@@ -5838,16 +5869,6 @@
             <a:r>
               <a:rPr lang="en-US" baseline="0" dirty="0" smtClean="0"/>
               <a:t> output</a:t>
-            </a:r>
-          </a:p>
-          <a:p>
-            <a:r>
-              <a:rPr lang="en-US" baseline="0" dirty="0" smtClean="0"/>
-              <a:t>Consistent </a:t>
-            </a:r>
-            <a:r>
-              <a:rPr lang="en-US" baseline="0" dirty="0" smtClean="0"/>
-              <a:t>format</a:t>
             </a:r>
           </a:p>
         </p:txBody>
@@ -6156,11 +6177,7 @@
             </a:r>
             <a:r>
               <a:rPr lang="en-US" baseline="0" dirty="0" smtClean="0"/>
-              <a:t> without editing </a:t>
-            </a:r>
-            <a:r>
-              <a:rPr lang="en-US" baseline="0" dirty="0" smtClean="0"/>
-              <a:t>code</a:t>
+              <a:t> without editing code</a:t>
             </a:r>
           </a:p>
           <a:p>
@@ -6168,12 +6185,11 @@
               <a:rPr lang="en-US" baseline="0" dirty="0" smtClean="0"/>
               <a:t>Change output location</a:t>
             </a:r>
-            <a:endParaRPr lang="en-US" baseline="0" dirty="0" smtClean="0"/>
           </a:p>
           <a:p>
             <a:r>
               <a:rPr lang="en-US" baseline="0" dirty="0" smtClean="0"/>
-              <a:t>Filter priority, location, activity</a:t>
+              <a:t>Filter by priority, location, activity</a:t>
             </a:r>
           </a:p>
         </p:txBody>
@@ -7019,7 +7035,31 @@
                 <a:ea typeface="+mn-ea"/>
                 <a:cs typeface="+mn-cs"/>
               </a:rPr>
-              <a:t> e.g., function entry and exit, details inside complex logic, details in loops</a:t>
+              <a:t> e.g., function entry and exit, details inside complex logic, </a:t>
+            </a:r>
+            <a:r>
+              <a:rPr lang="en-US" sz="2800" kern="1200" smtClean="0">
+                <a:solidFill>
+                  <a:schemeClr val="tx1"/>
+                </a:solidFill>
+                <a:effectLst/>
+                <a:latin typeface="+mn-lt"/>
+                <a:ea typeface="+mn-ea"/>
+                <a:cs typeface="+mn-cs"/>
+              </a:rPr>
+              <a:t>details inside </a:t>
+            </a:r>
+            <a:r>
+              <a:rPr lang="en-US" sz="2800" kern="1200" dirty="0" smtClean="0">
+                <a:solidFill>
+                  <a:schemeClr val="tx1"/>
+                </a:solidFill>
+                <a:effectLst/>
+                <a:latin typeface="+mn-lt"/>
+                <a:ea typeface="+mn-ea"/>
+                <a:cs typeface="+mn-cs"/>
+              </a:rPr>
+              <a:t>loops</a:t>
             </a:r>
           </a:p>
           <a:p>
@@ -7795,29 +7835,8 @@
                 <a:ea typeface="+mn-ea"/>
                 <a:cs typeface="+mn-cs"/>
               </a:rPr>
-              <a:t>Just tell the customer to add a couple environment variables and restart the </a:t>
-            </a:r>
-            <a:r>
-              <a:rPr lang="en-US" sz="2800" kern="1200" dirty="0" smtClean="0">
-                <a:solidFill>
-                  <a:schemeClr val="tx1"/>
-                </a:solidFill>
-                <a:effectLst/>
-                <a:latin typeface="+mn-lt"/>
-                <a:ea typeface="+mn-ea"/>
-                <a:cs typeface="+mn-cs"/>
-              </a:rPr>
-              <a:t>application</a:t>
-            </a:r>
-            <a:endParaRPr lang="en-US" sz="2800" kern="1200" dirty="0" smtClean="0">
-              <a:solidFill>
-                <a:schemeClr val="tx1"/>
-              </a:solidFill>
-              <a:effectLst/>
-              <a:latin typeface="+mn-lt"/>
-              <a:ea typeface="+mn-ea"/>
-              <a:cs typeface="+mn-cs"/>
-            </a:endParaRPr>
+              <a:t>Just tell the customer to add a couple environment variables and restart the application</a:t>
+            </a:r>
           </a:p>
           <a:p>
             <a:pPr lvl="2"/>
@@ -7831,29 +7850,8 @@
                 <a:ea typeface="+mn-ea"/>
                 <a:cs typeface="+mn-cs"/>
               </a:rPr>
-              <a:t>Yes, we actually did </a:t>
-            </a:r>
-            <a:r>
-              <a:rPr lang="en-US" sz="2400" kern="1200" dirty="0" smtClean="0">
-                <a:solidFill>
-                  <a:schemeClr val="tx1"/>
-                </a:solidFill>
-                <a:effectLst/>
-                <a:latin typeface="+mn-lt"/>
-                <a:ea typeface="+mn-ea"/>
-                <a:cs typeface="+mn-cs"/>
-              </a:rPr>
-              <a:t>that</a:t>
-            </a:r>
-            <a:endParaRPr lang="en-US" sz="2400" kern="1200" dirty="0" smtClean="0">
-              <a:solidFill>
-                <a:schemeClr val="tx1"/>
-              </a:solidFill>
-              <a:effectLst/>
-              <a:latin typeface="+mn-lt"/>
-              <a:ea typeface="+mn-ea"/>
-              <a:cs typeface="+mn-cs"/>
-            </a:endParaRPr>
+              <a:t>Yes, we actually did that</a:t>
+            </a:r>
           </a:p>
           <a:p>
             <a:pPr lvl="0"/>
@@ -8948,8 +8946,21 @@
                 <a:ea typeface="+mn-ea"/>
                 <a:cs typeface="+mn-cs"/>
               </a:rPr>
-              <a:t> eliminates most of it</a:t>
-            </a:r>
+              <a:t> eliminates most of </a:t>
+            </a:r>
+            <a:r>
+              <a:rPr lang="en-US" dirty="0" smtClean="0"/>
+              <a:t>the code</a:t>
+            </a:r>
+            <a:endParaRPr lang="en-US" sz="2800" kern="1200" dirty="0" smtClean="0">
+              <a:solidFill>
+                <a:schemeClr val="tx1"/>
+              </a:solidFill>
+              <a:effectLst/>
+              <a:latin typeface="+mn-lt"/>
+              <a:ea typeface="+mn-ea"/>
+              <a:cs typeface="+mn-cs"/>
+            </a:endParaRPr>
           </a:p>
           <a:p>
             <a:pPr lvl="1"/>
@@ -8975,8 +8986,52 @@
                 <a:ea typeface="+mn-ea"/>
                 <a:cs typeface="+mn-cs"/>
               </a:rPr>
-              <a:t> if you change production on/off</a:t>
-            </a:r>
+              <a:t> if you change production </a:t>
+            </a:r>
+            <a:r>
+              <a:rPr lang="en-US" sz="2800" kern="1200" baseline="0" dirty="0" smtClean="0">
+                <a:solidFill>
+                  <a:schemeClr val="tx1"/>
+                </a:solidFill>
+                <a:effectLst/>
+                <a:latin typeface="+mn-lt"/>
+                <a:ea typeface="+mn-ea"/>
+                <a:cs typeface="+mn-cs"/>
+              </a:rPr>
+              <a:t>on/off</a:t>
+            </a:r>
+            <a:endParaRPr lang="en-US" dirty="0"/>
+          </a:p>
+          <a:p>
+            <a:pPr lvl="1"/>
+            <a:endParaRPr lang="en-US" sz="2800" kern="1200" baseline="0" dirty="0" smtClean="0">
+              <a:solidFill>
+                <a:schemeClr val="tx1"/>
+              </a:solidFill>
+              <a:effectLst/>
+              <a:latin typeface="+mn-lt"/>
+              <a:ea typeface="+mn-ea"/>
+              <a:cs typeface="+mn-cs"/>
+            </a:endParaRPr>
+          </a:p>
+          <a:p>
+            <a:endParaRPr lang="en-US" sz="2800" dirty="0"/>
+          </a:p>
+          <a:p>
+            <a:r>
+              <a:rPr lang="en-US" sz="2400" dirty="0" smtClean="0">
+                <a:solidFill>
+                  <a:srgbClr val="00B050"/>
+                </a:solidFill>
+              </a:rPr>
+              <a:t>&lt;code: if production mode&gt;</a:t>
+            </a:r>
+            <a:endParaRPr lang="en-US" sz="2400" kern="1200" baseline="0" dirty="0" smtClean="0">
+              <a:solidFill>
+                <a:srgbClr val="00B050"/>
+              </a:solidFill>
+              <a:effectLst/>
+            </a:endParaRPr>
           </a:p>
         </p:txBody>
       </p:sp>
@@ -9148,8 +9203,28 @@
             <a:pPr lvl="0"/>
             <a:r>
               <a:rPr lang="en-US" baseline="0" dirty="0" smtClean="0"/>
-              <a:t>Singleton instance of the class</a:t>
-            </a:r>
+              <a:t>Singleton instance of the </a:t>
+            </a:r>
+            <a:r>
+              <a:rPr lang="en-US" baseline="0" dirty="0" smtClean="0"/>
+              <a:t>class</a:t>
+            </a:r>
+          </a:p>
+          <a:p>
+            <a:pPr lvl="1"/>
+            <a:r>
+              <a:rPr lang="en-US" dirty="0" smtClean="0"/>
+              <a:t>Read run </a:t>
+            </a:r>
+            <a:r>
+              <a:rPr lang="en-US" dirty="0" err="1" smtClean="0"/>
+              <a:t>params</a:t>
+            </a:r>
+            <a:r>
+              <a:rPr lang="en-US" dirty="0" smtClean="0"/>
+              <a:t> only once, at startup</a:t>
+            </a:r>
+            <a:endParaRPr lang="en-US" baseline="0" dirty="0" smtClean="0"/>
           </a:p>
           <a:p>
             <a:pPr lvl="0"/>
@@ -9969,11 +10044,7 @@
             <a:pPr lvl="1"/>
             <a:r>
               <a:rPr lang="en-US" dirty="0" smtClean="0"/>
-              <a:t>On priority, facility </a:t>
-            </a:r>
-            <a:r>
-              <a:rPr lang="en-US" dirty="0" smtClean="0"/>
-              <a:t>name</a:t>
+              <a:t>On priority, facility name</a:t>
             </a:r>
           </a:p>
           <a:p>
@@ -10122,11 +10193,7 @@
             </a:r>
             <a:r>
               <a:rPr lang="en-US" baseline="0" dirty="0" smtClean="0"/>
-              <a:t> for Regression </a:t>
-            </a:r>
-            <a:r>
-              <a:rPr lang="en-US" baseline="0" dirty="0" smtClean="0"/>
-              <a:t>Testing</a:t>
+              <a:t> for Regression Testing</a:t>
             </a:r>
             <a:endParaRPr lang="en-US" dirty="0"/>
           </a:p>
@@ -10203,15 +10270,6 @@
               </a:rPr>
               <a:t>Possible with trace logs in some cases</a:t>
             </a:r>
-            <a:endParaRPr lang="en-US" sz="3200" kern="1200" dirty="0" smtClean="0">
-              <a:solidFill>
-                <a:schemeClr val="tx1"/>
-              </a:solidFill>
-              <a:effectLst/>
-              <a:latin typeface="+mn-lt"/>
-              <a:ea typeface="+mn-ea"/>
-              <a:cs typeface="+mn-cs"/>
-            </a:endParaRPr>
           </a:p>
         </p:txBody>
       </p:sp>
@@ -10530,19 +10588,7 @@
           <a:p>
             <a:r>
               <a:rPr lang="en-US" dirty="0" smtClean="0"/>
-              <a:t>github.com/</a:t>
-            </a:r>
-            <a:r>
-              <a:rPr lang="en-US" dirty="0" err="1" smtClean="0"/>
-              <a:t>rblandau</a:t>
-            </a:r>
-            <a:r>
-              <a:rPr lang="en-US" dirty="0" smtClean="0"/>
-              <a:t>/</a:t>
-            </a:r>
-            <a:r>
-              <a:rPr lang="en-US" dirty="0" err="1" smtClean="0"/>
-              <a:t>NewTrace</a:t>
+              <a:t>www.github.com/rblandau/NewTrace</a:t>
             </a:r>
             <a:endParaRPr lang="en-US" dirty="0" smtClean="0"/>
           </a:p>
@@ -11329,8 +11375,11 @@
                 <a:ea typeface="+mn-ea"/>
                 <a:cs typeface="+mn-cs"/>
               </a:rPr>
-              <a:t>0 </a:t>
-            </a:r>
+              <a:t>0 major classes but 10-50,000 instances of some classes</a:t>
+            </a:r>
+          </a:p>
+          <a:p>
+            <a:pPr lvl="0"/>
             <a:r>
               <a:rPr lang="en-US" sz="3200" kern="1200" dirty="0" smtClean="0">
                 <a:solidFill>
@@ -11341,21 +11390,6 @@
                 <a:ea typeface="+mn-ea"/>
                 <a:cs typeface="+mn-cs"/>
               </a:rPr>
-              <a:t>major classes but 10-50,000 instances of some classes</a:t>
-            </a:r>
-          </a:p>
-          <a:p>
-            <a:pPr lvl="0"/>
-            <a:r>
-              <a:rPr lang="en-US" sz="3200" kern="1200" dirty="0" smtClean="0">
-                <a:solidFill>
-                  <a:schemeClr val="tx1"/>
-                </a:solidFill>
-                <a:effectLst/>
-                <a:latin typeface="+mn-lt"/>
-                <a:ea typeface="+mn-ea"/>
-                <a:cs typeface="+mn-cs"/>
-              </a:rPr>
               <a:t>(The debug</a:t>
             </a:r>
             <a:r>
@@ -11368,31 +11402,7 @@
                 <a:ea typeface="+mn-ea"/>
                 <a:cs typeface="+mn-cs"/>
               </a:rPr>
-              <a:t> package here </a:t>
-            </a:r>
-            <a:r>
-              <a:rPr lang="en-US" sz="3200" kern="1200" baseline="0" dirty="0" smtClean="0">
-                <a:solidFill>
-                  <a:schemeClr val="tx1"/>
-                </a:solidFill>
-                <a:effectLst/>
-                <a:latin typeface="+mn-lt"/>
-                <a:ea typeface="+mn-ea"/>
-                <a:cs typeface="+mn-cs"/>
-              </a:rPr>
-              <a:t>displays IDs, instance names</a:t>
-            </a:r>
-            <a:r>
-              <a:rPr lang="en-US" sz="3200" kern="1200" baseline="0" dirty="0" smtClean="0">
-                <a:solidFill>
-                  <a:schemeClr val="tx1"/>
-                </a:solidFill>
-                <a:effectLst/>
-                <a:latin typeface="+mn-lt"/>
-                <a:ea typeface="+mn-ea"/>
-                <a:cs typeface="+mn-cs"/>
-              </a:rPr>
-              <a:t>)</a:t>
+              <a:t> package here displays IDs, instance names)</a:t>
             </a:r>
             <a:endParaRPr lang="en-US" sz="3200" kern="1200" dirty="0" smtClean="0">
               <a:solidFill>

</xml_diff>